<commit_message>
Updating progress on a couple lessons (5&9) to mark them complete and updating lab 2 block diagram one last time.
</commit_message>
<xml_diff>
--- a/lab/lab2/ECE_383_Lab2.pptx
+++ b/lab/lab2/ECE_383_Lab2.pptx
@@ -1069,7 +1069,7 @@
                 </a:solidFill>
               </a:rPr>
               <a:pPr/>
-              <a:t>2/8/2017</a:t>
+              <a:t>2/10/2017</a:t>
             </a:fld>
             <a:endParaRPr lang="en-US">
               <a:solidFill>
@@ -1271,7 +1271,7 @@
                 </a:solidFill>
               </a:rPr>
               <a:pPr/>
-              <a:t>2/8/2017</a:t>
+              <a:t>2/10/2017</a:t>
             </a:fld>
             <a:endParaRPr lang="en-US">
               <a:solidFill>
@@ -1483,7 +1483,7 @@
                 </a:solidFill>
               </a:rPr>
               <a:pPr/>
-              <a:t>2/8/2017</a:t>
+              <a:t>2/10/2017</a:t>
             </a:fld>
             <a:endParaRPr lang="en-US">
               <a:solidFill>
@@ -1974,7 +1974,7 @@
                 </a:spcAft>
                 <a:defRPr/>
               </a:pPr>
-              <a:t>8 February 2017</a:t>
+              <a:t>10 February 2017</a:t>
             </a:fld>
             <a:endParaRPr lang="en-US" sz="1800">
               <a:solidFill>
@@ -2239,7 +2239,7 @@
                 </a:spcAft>
                 <a:defRPr/>
               </a:pPr>
-              <a:t>8 February 2017</a:t>
+              <a:t>10 February 2017</a:t>
             </a:fld>
             <a:endParaRPr lang="en-US" sz="1800">
               <a:solidFill>
@@ -2593,7 +2593,7 @@
                 </a:spcAft>
                 <a:defRPr/>
               </a:pPr>
-              <a:t>8 February 2017</a:t>
+              <a:t>10 February 2017</a:t>
             </a:fld>
             <a:endParaRPr lang="en-US" sz="1800">
               <a:solidFill>
@@ -3086,7 +3086,7 @@
                 </a:spcAft>
                 <a:defRPr/>
               </a:pPr>
-              <a:t>8 February 2017</a:t>
+              <a:t>10 February 2017</a:t>
             </a:fld>
             <a:endParaRPr lang="en-US" sz="1800">
               <a:solidFill>
@@ -3270,7 +3270,7 @@
                 </a:spcAft>
                 <a:defRPr/>
               </a:pPr>
-              <a:t>8 February 2017</a:t>
+              <a:t>10 February 2017</a:t>
             </a:fld>
             <a:endParaRPr lang="en-US" sz="1800">
               <a:solidFill>
@@ -3431,7 +3431,7 @@
                 </a:spcAft>
                 <a:defRPr/>
               </a:pPr>
-              <a:t>8 February 2017</a:t>
+              <a:t>10 February 2017</a:t>
             </a:fld>
             <a:endParaRPr lang="en-US" sz="1800">
               <a:solidFill>
@@ -3774,7 +3774,7 @@
                 </a:spcAft>
                 <a:defRPr/>
               </a:pPr>
-              <a:t>8 February 2017</a:t>
+              <a:t>10 February 2017</a:t>
             </a:fld>
             <a:endParaRPr lang="en-US" sz="1800">
               <a:solidFill>
@@ -3913,7 +3913,7 @@
                 </a:solidFill>
               </a:rPr>
               <a:pPr/>
-              <a:t>2/8/2017</a:t>
+              <a:t>2/10/2017</a:t>
             </a:fld>
             <a:endParaRPr lang="en-US">
               <a:solidFill>
@@ -4296,7 +4296,7 @@
                 </a:spcAft>
                 <a:defRPr/>
               </a:pPr>
-              <a:t>8 February 2017</a:t>
+              <a:t>10 February 2017</a:t>
             </a:fld>
             <a:endParaRPr lang="en-US" sz="1800">
               <a:solidFill>
@@ -4532,7 +4532,7 @@
                 </a:spcAft>
                 <a:defRPr/>
               </a:pPr>
-              <a:t>8 February 2017</a:t>
+              <a:t>10 February 2017</a:t>
             </a:fld>
             <a:endParaRPr lang="en-US" sz="1800">
               <a:solidFill>
@@ -4778,7 +4778,7 @@
                 </a:spcAft>
                 <a:defRPr/>
               </a:pPr>
-              <a:t>8 February 2017</a:t>
+              <a:t>10 February 2017</a:t>
             </a:fld>
             <a:endParaRPr lang="en-US" sz="1800">
               <a:solidFill>
@@ -4992,7 +4992,7 @@
                 </a:spcAft>
                 <a:defRPr/>
               </a:pPr>
-              <a:t>8 February 2017</a:t>
+              <a:t>10 February 2017</a:t>
             </a:fld>
             <a:endParaRPr lang="en-US" sz="1800">
               <a:solidFill>
@@ -5207,7 +5207,7 @@
                 </a:solidFill>
               </a:rPr>
               <a:pPr/>
-              <a:t>2/8/2017</a:t>
+              <a:t>2/10/2017</a:t>
             </a:fld>
             <a:endParaRPr lang="en-US">
               <a:solidFill>
@@ -5527,7 +5527,7 @@
                 </a:solidFill>
               </a:rPr>
               <a:pPr/>
-              <a:t>2/8/2017</a:t>
+              <a:t>2/10/2017</a:t>
             </a:fld>
             <a:endParaRPr lang="en-US">
               <a:solidFill>
@@ -5981,7 +5981,7 @@
                 </a:solidFill>
               </a:rPr>
               <a:pPr/>
-              <a:t>2/8/2017</a:t>
+              <a:t>2/10/2017</a:t>
             </a:fld>
             <a:endParaRPr lang="en-US">
               <a:solidFill>
@@ -6131,7 +6131,7 @@
                 </a:solidFill>
               </a:rPr>
               <a:pPr/>
-              <a:t>2/8/2017</a:t>
+              <a:t>2/10/2017</a:t>
             </a:fld>
             <a:endParaRPr lang="en-US">
               <a:solidFill>
@@ -6258,7 +6258,7 @@
                 </a:solidFill>
               </a:rPr>
               <a:pPr/>
-              <a:t>2/8/2017</a:t>
+              <a:t>2/10/2017</a:t>
             </a:fld>
             <a:endParaRPr lang="en-US">
               <a:solidFill>
@@ -6567,7 +6567,7 @@
                 </a:solidFill>
               </a:rPr>
               <a:pPr/>
-              <a:t>2/8/2017</a:t>
+              <a:t>2/10/2017</a:t>
             </a:fld>
             <a:endParaRPr lang="en-US">
               <a:solidFill>
@@ -6852,7 +6852,7 @@
                 </a:solidFill>
               </a:rPr>
               <a:pPr/>
-              <a:t>2/8/2017</a:t>
+              <a:t>2/10/2017</a:t>
             </a:fld>
             <a:endParaRPr lang="en-US">
               <a:solidFill>
@@ -7113,7 +7113,7 @@
                   <a:spcPts val="0"/>
                 </a:spcAft>
               </a:pPr>
-              <a:t>2/8/2017</a:t>
+              <a:t>2/10/2017</a:t>
             </a:fld>
             <a:endParaRPr lang="en-US">
               <a:solidFill>
@@ -14507,7 +14507,7 @@
                 </a:spcAft>
                 <a:defRPr/>
               </a:pPr>
-              <a:t>8 February 2017</a:t>
+              <a:t>10 February 2017</a:t>
             </a:fld>
             <a:endParaRPr lang="en-US" sz="1800">
               <a:solidFill>
@@ -14917,7 +14917,7 @@
                 </a:spcAft>
                 <a:defRPr/>
               </a:pPr>
-              <a:t>8 February 2017</a:t>
+              <a:t>10 February 2017</a:t>
             </a:fld>
             <a:endParaRPr lang="en-US" sz="1800">
               <a:solidFill>
@@ -19608,8 +19608,8 @@
         </p:blipFill>
         <p:spPr bwMode="auto">
           <a:xfrm>
-            <a:off x="328921" y="1450014"/>
-            <a:ext cx="8538226" cy="5308679"/>
+            <a:off x="427348" y="1450014"/>
+            <a:ext cx="8341371" cy="5308679"/>
           </a:xfrm>
           <a:prstGeom prst="rect">
             <a:avLst/>

</xml_diff>